<commit_message>
Sinusoidal PWM of 3L Inverter
</commit_message>
<xml_diff>
--- a/Reports/3-Level NPC Inverter Structure.pptx
+++ b/Reports/3-Level NPC Inverter Structure.pptx
@@ -8,7 +8,9 @@
     <p:sldId id="256" r:id="rId2"/>
     <p:sldId id="257" r:id="rId3"/>
     <p:sldId id="258" r:id="rId4"/>
-    <p:sldId id="259" r:id="rId5"/>
+    <p:sldId id="260" r:id="rId5"/>
+    <p:sldId id="261" r:id="rId6"/>
+    <p:sldId id="259" r:id="rId7"/>
   </p:sldIdLst>
   <p:sldSz cx="12192000" cy="6858000"/>
   <p:notesSz cx="6858000" cy="9144000"/>
@@ -264,7 +266,7 @@
           <a:p>
             <a:fld id="{69002B11-2462-4824-BA85-40F0AE5821C0}" type="datetimeFigureOut">
               <a:rPr lang="tr-TR" smtClean="0"/>
-              <a:t>12.03.2024</a:t>
+              <a:t>13.03.2024</a:t>
             </a:fld>
             <a:endParaRPr lang="tr-TR"/>
           </a:p>
@@ -464,7 +466,7 @@
           <a:p>
             <a:fld id="{69002B11-2462-4824-BA85-40F0AE5821C0}" type="datetimeFigureOut">
               <a:rPr lang="tr-TR" smtClean="0"/>
-              <a:t>12.03.2024</a:t>
+              <a:t>13.03.2024</a:t>
             </a:fld>
             <a:endParaRPr lang="tr-TR"/>
           </a:p>
@@ -674,7 +676,7 @@
           <a:p>
             <a:fld id="{69002B11-2462-4824-BA85-40F0AE5821C0}" type="datetimeFigureOut">
               <a:rPr lang="tr-TR" smtClean="0"/>
-              <a:t>12.03.2024</a:t>
+              <a:t>13.03.2024</a:t>
             </a:fld>
             <a:endParaRPr lang="tr-TR"/>
           </a:p>
@@ -874,7 +876,7 @@
           <a:p>
             <a:fld id="{69002B11-2462-4824-BA85-40F0AE5821C0}" type="datetimeFigureOut">
               <a:rPr lang="tr-TR" smtClean="0"/>
-              <a:t>12.03.2024</a:t>
+              <a:t>13.03.2024</a:t>
             </a:fld>
             <a:endParaRPr lang="tr-TR"/>
           </a:p>
@@ -1150,7 +1152,7 @@
           <a:p>
             <a:fld id="{69002B11-2462-4824-BA85-40F0AE5821C0}" type="datetimeFigureOut">
               <a:rPr lang="tr-TR" smtClean="0"/>
-              <a:t>12.03.2024</a:t>
+              <a:t>13.03.2024</a:t>
             </a:fld>
             <a:endParaRPr lang="tr-TR"/>
           </a:p>
@@ -1418,7 +1420,7 @@
           <a:p>
             <a:fld id="{69002B11-2462-4824-BA85-40F0AE5821C0}" type="datetimeFigureOut">
               <a:rPr lang="tr-TR" smtClean="0"/>
-              <a:t>12.03.2024</a:t>
+              <a:t>13.03.2024</a:t>
             </a:fld>
             <a:endParaRPr lang="tr-TR"/>
           </a:p>
@@ -1833,7 +1835,7 @@
           <a:p>
             <a:fld id="{69002B11-2462-4824-BA85-40F0AE5821C0}" type="datetimeFigureOut">
               <a:rPr lang="tr-TR" smtClean="0"/>
-              <a:t>12.03.2024</a:t>
+              <a:t>13.03.2024</a:t>
             </a:fld>
             <a:endParaRPr lang="tr-TR"/>
           </a:p>
@@ -1975,7 +1977,7 @@
           <a:p>
             <a:fld id="{69002B11-2462-4824-BA85-40F0AE5821C0}" type="datetimeFigureOut">
               <a:rPr lang="tr-TR" smtClean="0"/>
-              <a:t>12.03.2024</a:t>
+              <a:t>13.03.2024</a:t>
             </a:fld>
             <a:endParaRPr lang="tr-TR"/>
           </a:p>
@@ -2088,7 +2090,7 @@
           <a:p>
             <a:fld id="{69002B11-2462-4824-BA85-40F0AE5821C0}" type="datetimeFigureOut">
               <a:rPr lang="tr-TR" smtClean="0"/>
-              <a:t>12.03.2024</a:t>
+              <a:t>13.03.2024</a:t>
             </a:fld>
             <a:endParaRPr lang="tr-TR"/>
           </a:p>
@@ -2401,7 +2403,7 @@
           <a:p>
             <a:fld id="{69002B11-2462-4824-BA85-40F0AE5821C0}" type="datetimeFigureOut">
               <a:rPr lang="tr-TR" smtClean="0"/>
-              <a:t>12.03.2024</a:t>
+              <a:t>13.03.2024</a:t>
             </a:fld>
             <a:endParaRPr lang="tr-TR"/>
           </a:p>
@@ -2690,7 +2692,7 @@
           <a:p>
             <a:fld id="{69002B11-2462-4824-BA85-40F0AE5821C0}" type="datetimeFigureOut">
               <a:rPr lang="tr-TR" smtClean="0"/>
-              <a:t>12.03.2024</a:t>
+              <a:t>13.03.2024</a:t>
             </a:fld>
             <a:endParaRPr lang="tr-TR"/>
           </a:p>
@@ -2933,7 +2935,7 @@
           <a:p>
             <a:fld id="{69002B11-2462-4824-BA85-40F0AE5821C0}" type="datetimeFigureOut">
               <a:rPr lang="tr-TR" smtClean="0"/>
-              <a:t>12.03.2024</a:t>
+              <a:t>13.03.2024</a:t>
             </a:fld>
             <a:endParaRPr lang="tr-TR"/>
           </a:p>
@@ -3679,38 +3681,9 @@
           <a:lstStyle/>
           <a:p>
             <a:r>
-              <a:rPr lang="tr-TR" dirty="0" err="1"/>
-              <a:t>Phase</a:t>
-            </a:r>
-            <a:r>
               <a:rPr lang="tr-TR" dirty="0"/>
-              <a:t> </a:t>
-            </a:r>
-            <a:r>
-              <a:rPr lang="tr-TR" dirty="0" err="1"/>
-              <a:t>voltages</a:t>
-            </a:r>
-            <a:r>
-              <a:rPr lang="tr-TR" dirty="0"/>
-              <a:t> (</a:t>
-            </a:r>
-            <a:r>
-              <a:rPr lang="tr-TR" dirty="0" err="1"/>
-              <a:t>reference</a:t>
-            </a:r>
-            <a:r>
-              <a:rPr lang="tr-TR" dirty="0"/>
-              <a:t> </a:t>
-            </a:r>
-            <a:r>
-              <a:rPr lang="tr-TR" dirty="0" err="1"/>
-              <a:t>signals</a:t>
-            </a:r>
-            <a:r>
-              <a:rPr lang="tr-TR"/>
-              <a:t>);</a:t>
-            </a:r>
-            <a:endParaRPr lang="tr-TR" dirty="0"/>
+              <a:t>Phase voltages (reference signals);</a:t>
+            </a:r>
           </a:p>
           <a:p>
             <a:endParaRPr lang="tr-TR" dirty="0"/>
@@ -3729,47 +3702,38 @@
           </a:p>
           <a:p>
             <a:r>
-              <a:rPr lang="tr-TR" dirty="0" err="1"/>
-              <a:t>Two</a:t>
-            </a:r>
-            <a:r>
               <a:rPr lang="tr-TR" dirty="0"/>
-              <a:t> </a:t>
-            </a:r>
-            <a:r>
-              <a:rPr lang="tr-TR" dirty="0" err="1"/>
-              <a:t>triangular</a:t>
-            </a:r>
+              <a:t>Two triangular carrier signal </a:t>
+            </a:r>
+            <a:endParaRPr lang="en-US" dirty="0"/>
+          </a:p>
+          <a:p>
             <a:r>
               <a:rPr lang="tr-TR" dirty="0"/>
-              <a:t> </a:t>
-            </a:r>
-            <a:r>
-              <a:rPr lang="tr-TR" dirty="0" err="1"/>
-              <a:t>carrier</a:t>
+              <a:t>[0,Vdc</a:t>
+            </a:r>
+            <a:r>
+              <a:rPr lang="en-US" dirty="0"/>
+              <a:t>/</a:t>
             </a:r>
             <a:r>
               <a:rPr lang="tr-TR" dirty="0"/>
-              <a:t> </a:t>
-            </a:r>
-            <a:r>
-              <a:rPr lang="tr-TR" dirty="0" err="1"/>
-              <a:t>signal</a:t>
+              <a:t>2] &amp; [-Vdc</a:t>
+            </a:r>
+            <a:r>
+              <a:rPr lang="en-US" dirty="0"/>
+              <a:t>/</a:t>
             </a:r>
             <a:r>
               <a:rPr lang="tr-TR" dirty="0"/>
-              <a:t> [0,Vdc/2] &amp; [-</a:t>
-            </a:r>
-            <a:r>
-              <a:rPr lang="tr-TR" dirty="0" err="1"/>
-              <a:t>Vdc</a:t>
-            </a:r>
-            <a:r>
-              <a:rPr lang="tr-TR" dirty="0"/>
-              <a:t>\2,0]</a:t>
-            </a:r>
-          </a:p>
-          <a:p>
+              <a:t>2,0]</a:t>
+            </a:r>
+          </a:p>
+          <a:p>
+            <a:r>
+              <a:rPr lang="en-US" dirty="0"/>
+              <a:t>Peak amplitude=Vdc/2</a:t>
+            </a:r>
             <a:endParaRPr lang="tr-TR" dirty="0"/>
           </a:p>
           <a:p>
@@ -3814,6 +3778,53 @@
           <a:prstGeom prst="rect">
             <a:avLst/>
           </a:prstGeom>
+        </p:spPr>
+      </p:pic>
+      <p:pic>
+        <p:nvPicPr>
+          <p:cNvPr id="1026" name="Picture 2">
+            <a:extLst>
+              <a:ext uri="{FF2B5EF4-FFF2-40B4-BE49-F238E27FC236}">
+                <a16:creationId xmlns:a16="http://schemas.microsoft.com/office/drawing/2014/main" id="{143B62A1-F906-4063-7156-CEFE10676A3A}"/>
+              </a:ext>
+            </a:extLst>
+          </p:cNvPr>
+          <p:cNvPicPr>
+            <a:picLocks noChangeAspect="1" noChangeArrowheads="1"/>
+          </p:cNvPicPr>
+          <p:nvPr/>
+        </p:nvPicPr>
+        <p:blipFill>
+          <a:blip r:embed="rId3">
+            <a:extLst>
+              <a:ext uri="{28A0092B-C50C-407E-A947-70E740481C1C}">
+                <a14:useLocalDpi xmlns:a14="http://schemas.microsoft.com/office/drawing/2010/main" val="0"/>
+              </a:ext>
+            </a:extLst>
+          </a:blip>
+          <a:srcRect/>
+          <a:stretch>
+            <a:fillRect/>
+          </a:stretch>
+        </p:blipFill>
+        <p:spPr bwMode="auto">
+          <a:xfrm>
+            <a:off x="6441733" y="2658269"/>
+            <a:ext cx="4752975" cy="2686050"/>
+          </a:xfrm>
+          <a:prstGeom prst="rect">
+            <a:avLst/>
+          </a:prstGeom>
+          <a:noFill/>
+          <a:extLst>
+            <a:ext uri="{909E8E84-426E-40DD-AFC4-6F175D3DCCD1}">
+              <a14:hiddenFill xmlns:a14="http://schemas.microsoft.com/office/drawing/2010/main">
+                <a:solidFill>
+                  <a:srgbClr val="FFFFFF"/>
+                </a:solidFill>
+              </a14:hiddenFill>
+            </a:ext>
+          </a:extLst>
         </p:spPr>
       </p:pic>
     </p:spTree>
@@ -3832,6 +3843,14 @@
 <file path=ppt/slides/slide4.xml><?xml version="1.0" encoding="utf-8"?>
 <p:sld xmlns:a="http://schemas.openxmlformats.org/drawingml/2006/main" xmlns:r="http://schemas.openxmlformats.org/officeDocument/2006/relationships" xmlns:p="http://schemas.openxmlformats.org/presentationml/2006/main">
   <p:cSld>
+    <p:bg>
+      <p:bgPr>
+        <a:solidFill>
+          <a:schemeClr val="bg1"/>
+        </a:solidFill>
+        <a:effectLst/>
+      </p:bgPr>
+    </p:bg>
     <p:spTree>
       <p:nvGrpSpPr>
         <p:cNvPr id="1" name=""/>
@@ -3846,6 +3865,1096 @@
           <a:chExt cx="0" cy="0"/>
         </a:xfrm>
       </p:grpSpPr>
+      <p:sp useBgFill="1">
+        <p:nvSpPr>
+          <p:cNvPr id="14" name="Rectangle 13">
+            <a:extLst>
+              <a:ext uri="{FF2B5EF4-FFF2-40B4-BE49-F238E27FC236}">
+                <a16:creationId xmlns:a16="http://schemas.microsoft.com/office/drawing/2014/main" id="{53B021B3-DE93-4AB7-8A18-CF5F1CED88B8}"/>
+              </a:ext>
+              <a:ext uri="{C183D7F6-B498-43B3-948B-1728B52AA6E4}">
+                <adec:decorative xmlns:adec="http://schemas.microsoft.com/office/drawing/2017/decorative" val="1"/>
+              </a:ext>
+            </a:extLst>
+          </p:cNvPr>
+          <p:cNvSpPr>
+            <a:spLocks noGrp="1" noRot="1" noChangeAspect="1" noMove="1" noResize="1" noEditPoints="1" noAdjustHandles="1" noChangeArrowheads="1" noChangeShapeType="1" noTextEdit="1"/>
+          </p:cNvSpPr>
+          <p:nvPr>
+            <p:extLst>
+              <p:ext uri="{386F3935-93C4-4BCD-93E2-E3B085C9AB24}">
+                <p16:designElem xmlns:p16="http://schemas.microsoft.com/office/powerpoint/2015/main" val="1"/>
+              </p:ext>
+            </p:extLst>
+          </p:nvPr>
+        </p:nvSpPr>
+        <p:spPr>
+          <a:xfrm>
+            <a:off x="0" y="0"/>
+            <a:ext cx="12192000" cy="6858000"/>
+          </a:xfrm>
+          <a:prstGeom prst="rect">
+            <a:avLst/>
+          </a:prstGeom>
+          <a:ln>
+            <a:noFill/>
+          </a:ln>
+        </p:spPr>
+        <p:style>
+          <a:lnRef idx="2">
+            <a:schemeClr val="accent1">
+              <a:shade val="50000"/>
+            </a:schemeClr>
+          </a:lnRef>
+          <a:fillRef idx="1">
+            <a:schemeClr val="accent1"/>
+          </a:fillRef>
+          <a:effectRef idx="0">
+            <a:schemeClr val="accent1"/>
+          </a:effectRef>
+          <a:fontRef idx="minor">
+            <a:schemeClr val="lt1"/>
+          </a:fontRef>
+        </p:style>
+        <p:txBody>
+          <a:bodyPr rtlCol="0" anchor="ctr"/>
+          <a:lstStyle/>
+          <a:p>
+            <a:pPr algn="ctr"/>
+            <a:endParaRPr lang="en-US"/>
+          </a:p>
+        </p:txBody>
+      </p:sp>
+      <p:sp>
+        <p:nvSpPr>
+          <p:cNvPr id="2" name="Title 1">
+            <a:extLst>
+              <a:ext uri="{FF2B5EF4-FFF2-40B4-BE49-F238E27FC236}">
+                <a16:creationId xmlns:a16="http://schemas.microsoft.com/office/drawing/2014/main" id="{C5EB039D-75C3-AC7C-9F00-603F29CB7641}"/>
+              </a:ext>
+            </a:extLst>
+          </p:cNvPr>
+          <p:cNvSpPr>
+            <a:spLocks noGrp="1"/>
+          </p:cNvSpPr>
+          <p:nvPr>
+            <p:ph type="title"/>
+          </p:nvPr>
+        </p:nvSpPr>
+        <p:spPr>
+          <a:xfrm>
+            <a:off x="841248" y="256032"/>
+            <a:ext cx="10506456" cy="1014984"/>
+          </a:xfrm>
+        </p:spPr>
+        <p:txBody>
+          <a:bodyPr anchor="b">
+            <a:normAutofit/>
+          </a:bodyPr>
+          <a:lstStyle/>
+          <a:p>
+            <a:r>
+              <a:rPr lang="en-US"/>
+              <a:t>Sinusoidal PWM</a:t>
+            </a:r>
+            <a:endParaRPr lang="tr-TR" dirty="0"/>
+          </a:p>
+        </p:txBody>
+      </p:sp>
+      <p:sp>
+        <p:nvSpPr>
+          <p:cNvPr id="15" name="Rectangle 14">
+            <a:extLst>
+              <a:ext uri="{FF2B5EF4-FFF2-40B4-BE49-F238E27FC236}">
+                <a16:creationId xmlns:a16="http://schemas.microsoft.com/office/drawing/2014/main" id="{52D502E5-F6B4-4D58-B4AE-FC466FF15EE8}"/>
+              </a:ext>
+              <a:ext uri="{C183D7F6-B498-43B3-948B-1728B52AA6E4}">
+                <adec:decorative xmlns:adec="http://schemas.microsoft.com/office/drawing/2017/decorative" val="1"/>
+              </a:ext>
+            </a:extLst>
+          </p:cNvPr>
+          <p:cNvSpPr>
+            <a:spLocks noGrp="1" noRot="1" noChangeAspect="1" noMove="1" noResize="1" noEditPoints="1" noAdjustHandles="1" noChangeArrowheads="1" noChangeShapeType="1" noTextEdit="1"/>
+          </p:cNvSpPr>
+          <p:nvPr>
+            <p:extLst>
+              <p:ext uri="{386F3935-93C4-4BCD-93E2-E3B085C9AB24}">
+                <p16:designElem xmlns:p16="http://schemas.microsoft.com/office/powerpoint/2015/main" val="1"/>
+              </p:ext>
+            </p:extLst>
+          </p:nvPr>
+        </p:nvSpPr>
+        <p:spPr>
+          <a:xfrm>
+            <a:off x="865953" y="1634502"/>
+            <a:ext cx="10451592" cy="18288"/>
+          </a:xfrm>
+          <a:prstGeom prst="rect">
+            <a:avLst/>
+          </a:prstGeom>
+          <a:solidFill>
+            <a:srgbClr val="D5D5D5"/>
+          </a:solidFill>
+          <a:ln w="3175">
+            <a:noFill/>
+          </a:ln>
+          <a:effectLst/>
+        </p:spPr>
+        <p:style>
+          <a:lnRef idx="2">
+            <a:schemeClr val="accent1">
+              <a:shade val="50000"/>
+            </a:schemeClr>
+          </a:lnRef>
+          <a:fillRef idx="1">
+            <a:schemeClr val="accent1"/>
+          </a:fillRef>
+          <a:effectRef idx="0">
+            <a:schemeClr val="accent1"/>
+          </a:effectRef>
+          <a:fontRef idx="minor">
+            <a:schemeClr val="lt1"/>
+          </a:fontRef>
+        </p:style>
+        <p:txBody>
+          <a:bodyPr rtlCol="0" anchor="ctr"/>
+          <a:lstStyle/>
+          <a:p>
+            <a:pPr algn="ctr"/>
+            <a:endParaRPr lang="en-US">
+              <a:solidFill>
+                <a:prstClr val="white"/>
+              </a:solidFill>
+              <a:latin typeface="Calibri" panose="020F0502020204030204"/>
+            </a:endParaRPr>
+          </a:p>
+        </p:txBody>
+      </p:sp>
+      <p:sp>
+        <p:nvSpPr>
+          <p:cNvPr id="13" name="Rectangle 12">
+            <a:extLst>
+              <a:ext uri="{FF2B5EF4-FFF2-40B4-BE49-F238E27FC236}">
+                <a16:creationId xmlns:a16="http://schemas.microsoft.com/office/drawing/2014/main" id="{9DECDBF4-02B6-4BB4-B65B-B8107AD6A9E8}"/>
+              </a:ext>
+              <a:ext uri="{C183D7F6-B498-43B3-948B-1728B52AA6E4}">
+                <adec:decorative xmlns:adec="http://schemas.microsoft.com/office/drawing/2017/decorative" val="1"/>
+              </a:ext>
+            </a:extLst>
+          </p:cNvPr>
+          <p:cNvSpPr>
+            <a:spLocks noGrp="1" noRot="1" noChangeAspect="1" noMove="1" noResize="1" noEditPoints="1" noAdjustHandles="1" noChangeArrowheads="1" noChangeShapeType="1" noTextEdit="1"/>
+          </p:cNvSpPr>
+          <p:nvPr>
+            <p:extLst>
+              <p:ext uri="{386F3935-93C4-4BCD-93E2-E3B085C9AB24}">
+                <p16:designElem xmlns:p16="http://schemas.microsoft.com/office/powerpoint/2015/main" val="1"/>
+              </p:ext>
+            </p:extLst>
+          </p:nvPr>
+        </p:nvSpPr>
+        <p:spPr>
+          <a:xfrm flipV="1">
+            <a:off x="841248" y="1538176"/>
+            <a:ext cx="1873457" cy="109814"/>
+          </a:xfrm>
+          <a:prstGeom prst="rect">
+            <a:avLst/>
+          </a:prstGeom>
+          <a:solidFill>
+            <a:schemeClr val="accent2"/>
+          </a:solidFill>
+          <a:ln>
+            <a:noFill/>
+          </a:ln>
+        </p:spPr>
+        <p:style>
+          <a:lnRef idx="2">
+            <a:schemeClr val="accent1">
+              <a:shade val="50000"/>
+            </a:schemeClr>
+          </a:lnRef>
+          <a:fillRef idx="1">
+            <a:schemeClr val="accent1"/>
+          </a:fillRef>
+          <a:effectRef idx="0">
+            <a:schemeClr val="accent1"/>
+          </a:effectRef>
+          <a:fontRef idx="minor">
+            <a:schemeClr val="lt1"/>
+          </a:fontRef>
+        </p:style>
+        <p:txBody>
+          <a:bodyPr rtlCol="0" anchor="ctr"/>
+          <a:lstStyle/>
+          <a:p>
+            <a:pPr algn="ctr"/>
+            <a:endParaRPr lang="en-US">
+              <a:solidFill>
+                <a:prstClr val="white"/>
+              </a:solidFill>
+              <a:latin typeface="Calibri" panose="020F0502020204030204"/>
+            </a:endParaRPr>
+          </a:p>
+        </p:txBody>
+      </p:sp>
+      <p:graphicFrame>
+        <p:nvGraphicFramePr>
+          <p:cNvPr id="4" name="Content Placeholder 3">
+            <a:extLst>
+              <a:ext uri="{FF2B5EF4-FFF2-40B4-BE49-F238E27FC236}">
+                <a16:creationId xmlns:a16="http://schemas.microsoft.com/office/drawing/2014/main" id="{EACC6034-EEE7-64A0-9063-A10427B1FC26}"/>
+              </a:ext>
+            </a:extLst>
+          </p:cNvPr>
+          <p:cNvGraphicFramePr>
+            <a:graphicFrameLocks noGrp="1"/>
+          </p:cNvGraphicFramePr>
+          <p:nvPr>
+            <p:ph idx="1"/>
+            <p:extLst>
+              <p:ext uri="{D42A27DB-BD31-4B8C-83A1-F6EECF244321}">
+                <p14:modId xmlns:p14="http://schemas.microsoft.com/office/powerpoint/2010/main" val="17819194"/>
+              </p:ext>
+            </p:extLst>
+          </p:nvPr>
+        </p:nvGraphicFramePr>
+        <p:xfrm>
+          <a:off x="1836381" y="1915150"/>
+          <a:ext cx="8510736" cy="4357527"/>
+        </p:xfrm>
+        <a:graphic>
+          <a:graphicData uri="http://schemas.openxmlformats.org/drawingml/2006/table">
+            <a:tbl>
+              <a:tblPr firstRow="1" bandRow="1">
+                <a:tableStyleId>{5C22544A-7EE6-4342-B048-85BDC9FD1C3A}</a:tableStyleId>
+              </a:tblPr>
+              <a:tblGrid>
+                <a:gridCol w="3022744">
+                  <a:extLst>
+                    <a:ext uri="{9D8B030D-6E8A-4147-A177-3AD203B41FA5}">
+                      <a16:colId xmlns:a16="http://schemas.microsoft.com/office/drawing/2014/main" val="2473178487"/>
+                    </a:ext>
+                  </a:extLst>
+                </a:gridCol>
+                <a:gridCol w="1371998">
+                  <a:extLst>
+                    <a:ext uri="{9D8B030D-6E8A-4147-A177-3AD203B41FA5}">
+                      <a16:colId xmlns:a16="http://schemas.microsoft.com/office/drawing/2014/main" val="3258009248"/>
+                    </a:ext>
+                  </a:extLst>
+                </a:gridCol>
+                <a:gridCol w="1371998">
+                  <a:extLst>
+                    <a:ext uri="{9D8B030D-6E8A-4147-A177-3AD203B41FA5}">
+                      <a16:colId xmlns:a16="http://schemas.microsoft.com/office/drawing/2014/main" val="1228353265"/>
+                    </a:ext>
+                  </a:extLst>
+                </a:gridCol>
+                <a:gridCol w="1371998">
+                  <a:extLst>
+                    <a:ext uri="{9D8B030D-6E8A-4147-A177-3AD203B41FA5}">
+                      <a16:colId xmlns:a16="http://schemas.microsoft.com/office/drawing/2014/main" val="2559580038"/>
+                    </a:ext>
+                  </a:extLst>
+                </a:gridCol>
+                <a:gridCol w="1371998">
+                  <a:extLst>
+                    <a:ext uri="{9D8B030D-6E8A-4147-A177-3AD203B41FA5}">
+                      <a16:colId xmlns:a16="http://schemas.microsoft.com/office/drawing/2014/main" val="3090929261"/>
+                    </a:ext>
+                  </a:extLst>
+                </a:gridCol>
+              </a:tblGrid>
+              <a:tr h="535503">
+                <a:tc>
+                  <a:txBody>
+                    <a:bodyPr/>
+                    <a:lstStyle/>
+                    <a:p>
+                      <a:pPr algn="l" fontAlgn="b"/>
+                      <a:r>
+                        <a:rPr lang="tr-TR" sz="2800" u="none" strike="noStrike" dirty="0">
+                          <a:effectLst/>
+                        </a:rPr>
+                        <a:t>State</a:t>
+                      </a:r>
+                      <a:endParaRPr lang="tr-TR" sz="2800" b="1" i="0" u="none" strike="noStrike" dirty="0">
+                        <a:solidFill>
+                          <a:srgbClr val="000000"/>
+                        </a:solidFill>
+                        <a:effectLst/>
+                        <a:latin typeface="Calibri" panose="020F0502020204030204" pitchFamily="34" charset="0"/>
+                      </a:endParaRPr>
+                    </a:p>
+                  </a:txBody>
+                  <a:tcPr marL="23864" marR="23864" marT="23864" marB="0" anchor="b"/>
+                </a:tc>
+                <a:tc>
+                  <a:txBody>
+                    <a:bodyPr/>
+                    <a:lstStyle/>
+                    <a:p>
+                      <a:pPr algn="l" fontAlgn="b"/>
+                      <a:r>
+                        <a:rPr lang="tr-TR" sz="2800" u="none" strike="noStrike">
+                          <a:effectLst/>
+                        </a:rPr>
+                        <a:t>Q1</a:t>
+                      </a:r>
+                      <a:endParaRPr lang="tr-TR" sz="2800" b="1" i="0" u="none" strike="noStrike">
+                        <a:solidFill>
+                          <a:srgbClr val="000000"/>
+                        </a:solidFill>
+                        <a:effectLst/>
+                        <a:latin typeface="Calibri" panose="020F0502020204030204" pitchFamily="34" charset="0"/>
+                      </a:endParaRPr>
+                    </a:p>
+                  </a:txBody>
+                  <a:tcPr marL="23864" marR="23864" marT="23864" marB="0" anchor="b"/>
+                </a:tc>
+                <a:tc>
+                  <a:txBody>
+                    <a:bodyPr/>
+                    <a:lstStyle/>
+                    <a:p>
+                      <a:pPr algn="l" fontAlgn="b"/>
+                      <a:r>
+                        <a:rPr lang="tr-TR" sz="2800" u="none" strike="noStrike">
+                          <a:effectLst/>
+                        </a:rPr>
+                        <a:t>Q2</a:t>
+                      </a:r>
+                      <a:endParaRPr lang="tr-TR" sz="2800" b="1" i="0" u="none" strike="noStrike">
+                        <a:solidFill>
+                          <a:srgbClr val="000000"/>
+                        </a:solidFill>
+                        <a:effectLst/>
+                        <a:latin typeface="Calibri" panose="020F0502020204030204" pitchFamily="34" charset="0"/>
+                      </a:endParaRPr>
+                    </a:p>
+                  </a:txBody>
+                  <a:tcPr marL="23864" marR="23864" marT="23864" marB="0" anchor="b"/>
+                </a:tc>
+                <a:tc>
+                  <a:txBody>
+                    <a:bodyPr/>
+                    <a:lstStyle/>
+                    <a:p>
+                      <a:pPr algn="l" fontAlgn="b"/>
+                      <a:r>
+                        <a:rPr lang="tr-TR" sz="2800" u="none" strike="noStrike">
+                          <a:effectLst/>
+                        </a:rPr>
+                        <a:t>Q3</a:t>
+                      </a:r>
+                      <a:endParaRPr lang="tr-TR" sz="2800" b="1" i="0" u="none" strike="noStrike">
+                        <a:solidFill>
+                          <a:srgbClr val="000000"/>
+                        </a:solidFill>
+                        <a:effectLst/>
+                        <a:latin typeface="Calibri" panose="020F0502020204030204" pitchFamily="34" charset="0"/>
+                      </a:endParaRPr>
+                    </a:p>
+                  </a:txBody>
+                  <a:tcPr marL="23864" marR="23864" marT="23864" marB="0" anchor="b"/>
+                </a:tc>
+                <a:tc>
+                  <a:txBody>
+                    <a:bodyPr/>
+                    <a:lstStyle/>
+                    <a:p>
+                      <a:pPr algn="l" fontAlgn="b"/>
+                      <a:r>
+                        <a:rPr lang="tr-TR" sz="2800" u="none" strike="noStrike">
+                          <a:effectLst/>
+                        </a:rPr>
+                        <a:t>Q4</a:t>
+                      </a:r>
+                      <a:endParaRPr lang="tr-TR" sz="2800" b="1" i="0" u="none" strike="noStrike">
+                        <a:solidFill>
+                          <a:srgbClr val="000000"/>
+                        </a:solidFill>
+                        <a:effectLst/>
+                        <a:latin typeface="Calibri" panose="020F0502020204030204" pitchFamily="34" charset="0"/>
+                      </a:endParaRPr>
+                    </a:p>
+                  </a:txBody>
+                  <a:tcPr marL="23864" marR="23864" marT="23864" marB="0" anchor="b"/>
+                </a:tc>
+                <a:extLst>
+                  <a:ext uri="{0D108BD9-81ED-4DB2-BD59-A6C34878D82A}">
+                    <a16:rowId xmlns:a16="http://schemas.microsoft.com/office/drawing/2014/main" val="2872731156"/>
+                  </a:ext>
+                </a:extLst>
+              </a:tr>
+              <a:tr h="955506">
+                <a:tc>
+                  <a:txBody>
+                    <a:bodyPr/>
+                    <a:lstStyle/>
+                    <a:p>
+                      <a:pPr algn="ctr" fontAlgn="b"/>
+                      <a:r>
+                        <a:rPr lang="tr-TR" sz="2800" u="none" strike="noStrike" dirty="0">
+                          <a:effectLst/>
+                        </a:rPr>
+                        <a:t>Carrier1</a:t>
+                      </a:r>
+                      <a:r>
+                        <a:rPr lang="en-US" sz="2800" u="none" strike="noStrike" dirty="0">
+                          <a:effectLst/>
+                        </a:rPr>
+                        <a:t>&lt;</a:t>
+                      </a:r>
+                      <a:r>
+                        <a:rPr lang="tr-TR" sz="2800" u="none" strike="noStrike" dirty="0">
+                          <a:effectLst/>
+                        </a:rPr>
+                        <a:t>reference Carrier2</a:t>
+                      </a:r>
+                      <a:r>
+                        <a:rPr lang="en-US" sz="2800" u="none" strike="noStrike" dirty="0">
+                          <a:effectLst/>
+                        </a:rPr>
+                        <a:t>&lt;</a:t>
+                      </a:r>
+                      <a:r>
+                        <a:rPr lang="tr-TR" sz="2800" u="none" strike="noStrike" dirty="0">
+                          <a:effectLst/>
+                        </a:rPr>
+                        <a:t>reference</a:t>
+                      </a:r>
+                      <a:endParaRPr lang="tr-TR" sz="2800" b="1" i="0" u="none" strike="noStrike" dirty="0">
+                        <a:solidFill>
+                          <a:srgbClr val="000000"/>
+                        </a:solidFill>
+                        <a:effectLst/>
+                        <a:latin typeface="Calibri" panose="020F0502020204030204" pitchFamily="34" charset="0"/>
+                      </a:endParaRPr>
+                    </a:p>
+                  </a:txBody>
+                  <a:tcPr marL="23864" marR="23864" marT="23864" marB="0" anchor="b"/>
+                </a:tc>
+                <a:tc>
+                  <a:txBody>
+                    <a:bodyPr/>
+                    <a:lstStyle/>
+                    <a:p>
+                      <a:pPr algn="l" fontAlgn="b"/>
+                      <a:r>
+                        <a:rPr lang="tr-TR" sz="2800" u="none" strike="noStrike">
+                          <a:effectLst/>
+                        </a:rPr>
+                        <a:t>ON</a:t>
+                      </a:r>
+                      <a:endParaRPr lang="tr-TR" sz="2800" b="1" i="0" u="none" strike="noStrike">
+                        <a:solidFill>
+                          <a:srgbClr val="000000"/>
+                        </a:solidFill>
+                        <a:effectLst/>
+                        <a:latin typeface="Calibri" panose="020F0502020204030204" pitchFamily="34" charset="0"/>
+                      </a:endParaRPr>
+                    </a:p>
+                  </a:txBody>
+                  <a:tcPr marL="23864" marR="23864" marT="23864" marB="0" anchor="b"/>
+                </a:tc>
+                <a:tc>
+                  <a:txBody>
+                    <a:bodyPr/>
+                    <a:lstStyle/>
+                    <a:p>
+                      <a:pPr algn="l" fontAlgn="b"/>
+                      <a:r>
+                        <a:rPr lang="tr-TR" sz="2800" u="none" strike="noStrike">
+                          <a:effectLst/>
+                        </a:rPr>
+                        <a:t>ON</a:t>
+                      </a:r>
+                      <a:endParaRPr lang="tr-TR" sz="2800" b="1" i="0" u="none" strike="noStrike">
+                        <a:solidFill>
+                          <a:srgbClr val="000000"/>
+                        </a:solidFill>
+                        <a:effectLst/>
+                        <a:latin typeface="Calibri" panose="020F0502020204030204" pitchFamily="34" charset="0"/>
+                      </a:endParaRPr>
+                    </a:p>
+                  </a:txBody>
+                  <a:tcPr marL="23864" marR="23864" marT="23864" marB="0" anchor="b"/>
+                </a:tc>
+                <a:tc>
+                  <a:txBody>
+                    <a:bodyPr/>
+                    <a:lstStyle/>
+                    <a:p>
+                      <a:pPr algn="l" fontAlgn="b"/>
+                      <a:r>
+                        <a:rPr lang="tr-TR" sz="2800" u="none" strike="noStrike" dirty="0">
+                          <a:effectLst/>
+                        </a:rPr>
+                        <a:t>OFF</a:t>
+                      </a:r>
+                      <a:endParaRPr lang="tr-TR" sz="2800" b="1" i="0" u="none" strike="noStrike" dirty="0">
+                        <a:solidFill>
+                          <a:srgbClr val="000000"/>
+                        </a:solidFill>
+                        <a:effectLst/>
+                        <a:latin typeface="Calibri" panose="020F0502020204030204" pitchFamily="34" charset="0"/>
+                      </a:endParaRPr>
+                    </a:p>
+                  </a:txBody>
+                  <a:tcPr marL="23864" marR="23864" marT="23864" marB="0" anchor="b"/>
+                </a:tc>
+                <a:tc>
+                  <a:txBody>
+                    <a:bodyPr/>
+                    <a:lstStyle/>
+                    <a:p>
+                      <a:pPr algn="l" fontAlgn="b"/>
+                      <a:r>
+                        <a:rPr lang="tr-TR" sz="2800" u="none" strike="noStrike">
+                          <a:effectLst/>
+                        </a:rPr>
+                        <a:t>OFF</a:t>
+                      </a:r>
+                      <a:endParaRPr lang="tr-TR" sz="2800" b="1" i="0" u="none" strike="noStrike">
+                        <a:solidFill>
+                          <a:srgbClr val="000000"/>
+                        </a:solidFill>
+                        <a:effectLst/>
+                        <a:latin typeface="Calibri" panose="020F0502020204030204" pitchFamily="34" charset="0"/>
+                      </a:endParaRPr>
+                    </a:p>
+                  </a:txBody>
+                  <a:tcPr marL="23864" marR="23864" marT="23864" marB="0" anchor="b"/>
+                </a:tc>
+                <a:extLst>
+                  <a:ext uri="{0D108BD9-81ED-4DB2-BD59-A6C34878D82A}">
+                    <a16:rowId xmlns:a16="http://schemas.microsoft.com/office/drawing/2014/main" val="1306186903"/>
+                  </a:ext>
+                </a:extLst>
+              </a:tr>
+              <a:tr h="955506">
+                <a:tc>
+                  <a:txBody>
+                    <a:bodyPr/>
+                    <a:lstStyle/>
+                    <a:p>
+                      <a:pPr algn="ctr" fontAlgn="b"/>
+                      <a:r>
+                        <a:rPr lang="tr-TR" sz="2800" u="none" strike="noStrike" dirty="0">
+                          <a:effectLst/>
+                        </a:rPr>
+                        <a:t>Carrier1&gt;reference Carrier2&lt;reference</a:t>
+                      </a:r>
+                      <a:endParaRPr lang="tr-TR" sz="2800" b="1" i="0" u="none" strike="noStrike" dirty="0">
+                        <a:solidFill>
+                          <a:srgbClr val="000000"/>
+                        </a:solidFill>
+                        <a:effectLst/>
+                        <a:latin typeface="Calibri" panose="020F0502020204030204" pitchFamily="34" charset="0"/>
+                      </a:endParaRPr>
+                    </a:p>
+                  </a:txBody>
+                  <a:tcPr marL="23864" marR="23864" marT="23864" marB="0" anchor="b"/>
+                </a:tc>
+                <a:tc>
+                  <a:txBody>
+                    <a:bodyPr/>
+                    <a:lstStyle/>
+                    <a:p>
+                      <a:pPr algn="l" fontAlgn="b"/>
+                      <a:r>
+                        <a:rPr lang="tr-TR" sz="2800" u="none" strike="noStrike">
+                          <a:effectLst/>
+                        </a:rPr>
+                        <a:t>OFF</a:t>
+                      </a:r>
+                      <a:endParaRPr lang="tr-TR" sz="2800" b="1" i="0" u="none" strike="noStrike">
+                        <a:solidFill>
+                          <a:srgbClr val="000000"/>
+                        </a:solidFill>
+                        <a:effectLst/>
+                        <a:latin typeface="Calibri" panose="020F0502020204030204" pitchFamily="34" charset="0"/>
+                      </a:endParaRPr>
+                    </a:p>
+                  </a:txBody>
+                  <a:tcPr marL="23864" marR="23864" marT="23864" marB="0" anchor="b"/>
+                </a:tc>
+                <a:tc>
+                  <a:txBody>
+                    <a:bodyPr/>
+                    <a:lstStyle/>
+                    <a:p>
+                      <a:pPr algn="l" fontAlgn="b"/>
+                      <a:r>
+                        <a:rPr lang="tr-TR" sz="2800" u="none" strike="noStrike" dirty="0">
+                          <a:effectLst/>
+                        </a:rPr>
+                        <a:t>ON</a:t>
+                      </a:r>
+                      <a:endParaRPr lang="tr-TR" sz="2800" b="1" i="0" u="none" strike="noStrike" dirty="0">
+                        <a:solidFill>
+                          <a:srgbClr val="000000"/>
+                        </a:solidFill>
+                        <a:effectLst/>
+                        <a:latin typeface="Calibri" panose="020F0502020204030204" pitchFamily="34" charset="0"/>
+                      </a:endParaRPr>
+                    </a:p>
+                  </a:txBody>
+                  <a:tcPr marL="23864" marR="23864" marT="23864" marB="0" anchor="b"/>
+                </a:tc>
+                <a:tc>
+                  <a:txBody>
+                    <a:bodyPr/>
+                    <a:lstStyle/>
+                    <a:p>
+                      <a:pPr algn="l" fontAlgn="b"/>
+                      <a:r>
+                        <a:rPr lang="tr-TR" sz="2800" u="none" strike="noStrike">
+                          <a:effectLst/>
+                        </a:rPr>
+                        <a:t>ON</a:t>
+                      </a:r>
+                      <a:endParaRPr lang="tr-TR" sz="2800" b="1" i="0" u="none" strike="noStrike">
+                        <a:solidFill>
+                          <a:srgbClr val="000000"/>
+                        </a:solidFill>
+                        <a:effectLst/>
+                        <a:latin typeface="Calibri" panose="020F0502020204030204" pitchFamily="34" charset="0"/>
+                      </a:endParaRPr>
+                    </a:p>
+                  </a:txBody>
+                  <a:tcPr marL="23864" marR="23864" marT="23864" marB="0" anchor="b"/>
+                </a:tc>
+                <a:tc>
+                  <a:txBody>
+                    <a:bodyPr/>
+                    <a:lstStyle/>
+                    <a:p>
+                      <a:pPr algn="l" fontAlgn="b"/>
+                      <a:r>
+                        <a:rPr lang="tr-TR" sz="2800" u="none" strike="noStrike">
+                          <a:effectLst/>
+                        </a:rPr>
+                        <a:t>OFF</a:t>
+                      </a:r>
+                      <a:endParaRPr lang="tr-TR" sz="2800" b="1" i="0" u="none" strike="noStrike">
+                        <a:solidFill>
+                          <a:srgbClr val="000000"/>
+                        </a:solidFill>
+                        <a:effectLst/>
+                        <a:latin typeface="Calibri" panose="020F0502020204030204" pitchFamily="34" charset="0"/>
+                      </a:endParaRPr>
+                    </a:p>
+                  </a:txBody>
+                  <a:tcPr marL="23864" marR="23864" marT="23864" marB="0" anchor="b"/>
+                </a:tc>
+                <a:extLst>
+                  <a:ext uri="{0D108BD9-81ED-4DB2-BD59-A6C34878D82A}">
+                    <a16:rowId xmlns:a16="http://schemas.microsoft.com/office/drawing/2014/main" val="2447343177"/>
+                  </a:ext>
+                </a:extLst>
+              </a:tr>
+              <a:tr h="955506">
+                <a:tc>
+                  <a:txBody>
+                    <a:bodyPr/>
+                    <a:lstStyle/>
+                    <a:p>
+                      <a:pPr algn="ctr" fontAlgn="b"/>
+                      <a:r>
+                        <a:rPr lang="tr-TR" sz="2800" u="none" strike="noStrike" dirty="0">
+                          <a:effectLst/>
+                        </a:rPr>
+                        <a:t>Carrier1&lt;reference Carrier2&gt;reference</a:t>
+                      </a:r>
+                      <a:endParaRPr lang="tr-TR" sz="2800" b="1" i="0" u="none" strike="noStrike" dirty="0">
+                        <a:solidFill>
+                          <a:srgbClr val="000000"/>
+                        </a:solidFill>
+                        <a:effectLst/>
+                        <a:latin typeface="Calibri" panose="020F0502020204030204" pitchFamily="34" charset="0"/>
+                      </a:endParaRPr>
+                    </a:p>
+                  </a:txBody>
+                  <a:tcPr marL="23864" marR="23864" marT="23864" marB="0" anchor="b"/>
+                </a:tc>
+                <a:tc>
+                  <a:txBody>
+                    <a:bodyPr/>
+                    <a:lstStyle/>
+                    <a:p>
+                      <a:pPr algn="l" fontAlgn="b"/>
+                      <a:r>
+                        <a:rPr lang="tr-TR" sz="2800" u="none" strike="noStrike">
+                          <a:effectLst/>
+                        </a:rPr>
+                        <a:t>OFF</a:t>
+                      </a:r>
+                      <a:endParaRPr lang="tr-TR" sz="2800" b="1" i="0" u="none" strike="noStrike">
+                        <a:solidFill>
+                          <a:srgbClr val="000000"/>
+                        </a:solidFill>
+                        <a:effectLst/>
+                        <a:latin typeface="Calibri" panose="020F0502020204030204" pitchFamily="34" charset="0"/>
+                      </a:endParaRPr>
+                    </a:p>
+                  </a:txBody>
+                  <a:tcPr marL="23864" marR="23864" marT="23864" marB="0" anchor="b"/>
+                </a:tc>
+                <a:tc>
+                  <a:txBody>
+                    <a:bodyPr/>
+                    <a:lstStyle/>
+                    <a:p>
+                      <a:pPr algn="l" fontAlgn="b"/>
+                      <a:r>
+                        <a:rPr lang="tr-TR" sz="2800" u="none" strike="noStrike" dirty="0">
+                          <a:effectLst/>
+                        </a:rPr>
+                        <a:t>ON</a:t>
+                      </a:r>
+                      <a:endParaRPr lang="tr-TR" sz="2800" b="1" i="0" u="none" strike="noStrike" dirty="0">
+                        <a:solidFill>
+                          <a:srgbClr val="000000"/>
+                        </a:solidFill>
+                        <a:effectLst/>
+                        <a:latin typeface="Calibri" panose="020F0502020204030204" pitchFamily="34" charset="0"/>
+                      </a:endParaRPr>
+                    </a:p>
+                  </a:txBody>
+                  <a:tcPr marL="23864" marR="23864" marT="23864" marB="0" anchor="b"/>
+                </a:tc>
+                <a:tc>
+                  <a:txBody>
+                    <a:bodyPr/>
+                    <a:lstStyle/>
+                    <a:p>
+                      <a:pPr algn="l" fontAlgn="b"/>
+                      <a:r>
+                        <a:rPr lang="tr-TR" sz="2800" u="none" strike="noStrike" dirty="0">
+                          <a:effectLst/>
+                        </a:rPr>
+                        <a:t>ON</a:t>
+                      </a:r>
+                      <a:endParaRPr lang="tr-TR" sz="2800" b="1" i="0" u="none" strike="noStrike" dirty="0">
+                        <a:solidFill>
+                          <a:srgbClr val="000000"/>
+                        </a:solidFill>
+                        <a:effectLst/>
+                        <a:latin typeface="Calibri" panose="020F0502020204030204" pitchFamily="34" charset="0"/>
+                      </a:endParaRPr>
+                    </a:p>
+                  </a:txBody>
+                  <a:tcPr marL="23864" marR="23864" marT="23864" marB="0" anchor="b"/>
+                </a:tc>
+                <a:tc>
+                  <a:txBody>
+                    <a:bodyPr/>
+                    <a:lstStyle/>
+                    <a:p>
+                      <a:pPr algn="l" fontAlgn="b"/>
+                      <a:r>
+                        <a:rPr lang="tr-TR" sz="2800" u="none" strike="noStrike" dirty="0">
+                          <a:effectLst/>
+                        </a:rPr>
+                        <a:t>OFF</a:t>
+                      </a:r>
+                      <a:endParaRPr lang="tr-TR" sz="2800" b="1" i="0" u="none" strike="noStrike" dirty="0">
+                        <a:solidFill>
+                          <a:srgbClr val="000000"/>
+                        </a:solidFill>
+                        <a:effectLst/>
+                        <a:latin typeface="Calibri" panose="020F0502020204030204" pitchFamily="34" charset="0"/>
+                      </a:endParaRPr>
+                    </a:p>
+                  </a:txBody>
+                  <a:tcPr marL="23864" marR="23864" marT="23864" marB="0" anchor="b"/>
+                </a:tc>
+                <a:extLst>
+                  <a:ext uri="{0D108BD9-81ED-4DB2-BD59-A6C34878D82A}">
+                    <a16:rowId xmlns:a16="http://schemas.microsoft.com/office/drawing/2014/main" val="1989896665"/>
+                  </a:ext>
+                </a:extLst>
+              </a:tr>
+              <a:tr h="955506">
+                <a:tc>
+                  <a:txBody>
+                    <a:bodyPr/>
+                    <a:lstStyle/>
+                    <a:p>
+                      <a:pPr algn="ctr" fontAlgn="b"/>
+                      <a:r>
+                        <a:rPr lang="tr-TR" sz="2800" u="none" strike="noStrike" dirty="0">
+                          <a:effectLst/>
+                        </a:rPr>
+                        <a:t>Carrier1</a:t>
+                      </a:r>
+                      <a:r>
+                        <a:rPr lang="en-US" sz="2800" u="none" strike="noStrike" dirty="0">
+                          <a:effectLst/>
+                        </a:rPr>
+                        <a:t>&gt;</a:t>
+                      </a:r>
+                      <a:r>
+                        <a:rPr lang="tr-TR" sz="2800" u="none" strike="noStrike" dirty="0">
+                          <a:effectLst/>
+                        </a:rPr>
+                        <a:t>reference Carrier2</a:t>
+                      </a:r>
+                      <a:r>
+                        <a:rPr lang="en-US" sz="2800" u="none" strike="noStrike" dirty="0">
+                          <a:effectLst/>
+                        </a:rPr>
+                        <a:t>&gt;</a:t>
+                      </a:r>
+                      <a:r>
+                        <a:rPr lang="tr-TR" sz="2800" u="none" strike="noStrike" dirty="0">
+                          <a:effectLst/>
+                        </a:rPr>
+                        <a:t>reference</a:t>
+                      </a:r>
+                      <a:endParaRPr lang="tr-TR" sz="2800" b="1" i="0" u="none" strike="noStrike" dirty="0">
+                        <a:solidFill>
+                          <a:srgbClr val="000000"/>
+                        </a:solidFill>
+                        <a:effectLst/>
+                        <a:latin typeface="Calibri" panose="020F0502020204030204" pitchFamily="34" charset="0"/>
+                      </a:endParaRPr>
+                    </a:p>
+                  </a:txBody>
+                  <a:tcPr marL="23864" marR="23864" marT="23864" marB="0" anchor="b"/>
+                </a:tc>
+                <a:tc>
+                  <a:txBody>
+                    <a:bodyPr/>
+                    <a:lstStyle/>
+                    <a:p>
+                      <a:pPr algn="l" fontAlgn="b"/>
+                      <a:r>
+                        <a:rPr lang="tr-TR" sz="2800" u="none" strike="noStrike">
+                          <a:effectLst/>
+                        </a:rPr>
+                        <a:t>OFF</a:t>
+                      </a:r>
+                      <a:endParaRPr lang="tr-TR" sz="2800" b="1" i="0" u="none" strike="noStrike">
+                        <a:solidFill>
+                          <a:srgbClr val="000000"/>
+                        </a:solidFill>
+                        <a:effectLst/>
+                        <a:latin typeface="Calibri" panose="020F0502020204030204" pitchFamily="34" charset="0"/>
+                      </a:endParaRPr>
+                    </a:p>
+                  </a:txBody>
+                  <a:tcPr marL="23864" marR="23864" marT="23864" marB="0" anchor="b"/>
+                </a:tc>
+                <a:tc>
+                  <a:txBody>
+                    <a:bodyPr/>
+                    <a:lstStyle/>
+                    <a:p>
+                      <a:pPr algn="l" fontAlgn="b"/>
+                      <a:r>
+                        <a:rPr lang="tr-TR" sz="2800" u="none" strike="noStrike">
+                          <a:effectLst/>
+                        </a:rPr>
+                        <a:t>OFF</a:t>
+                      </a:r>
+                      <a:endParaRPr lang="tr-TR" sz="2800" b="1" i="0" u="none" strike="noStrike">
+                        <a:solidFill>
+                          <a:srgbClr val="000000"/>
+                        </a:solidFill>
+                        <a:effectLst/>
+                        <a:latin typeface="Calibri" panose="020F0502020204030204" pitchFamily="34" charset="0"/>
+                      </a:endParaRPr>
+                    </a:p>
+                  </a:txBody>
+                  <a:tcPr marL="23864" marR="23864" marT="23864" marB="0" anchor="b"/>
+                </a:tc>
+                <a:tc>
+                  <a:txBody>
+                    <a:bodyPr/>
+                    <a:lstStyle/>
+                    <a:p>
+                      <a:pPr algn="l" fontAlgn="b"/>
+                      <a:r>
+                        <a:rPr lang="tr-TR" sz="2800" u="none" strike="noStrike">
+                          <a:effectLst/>
+                        </a:rPr>
+                        <a:t>ON</a:t>
+                      </a:r>
+                      <a:endParaRPr lang="tr-TR" sz="2800" b="1" i="0" u="none" strike="noStrike">
+                        <a:solidFill>
+                          <a:srgbClr val="000000"/>
+                        </a:solidFill>
+                        <a:effectLst/>
+                        <a:latin typeface="Calibri" panose="020F0502020204030204" pitchFamily="34" charset="0"/>
+                      </a:endParaRPr>
+                    </a:p>
+                  </a:txBody>
+                  <a:tcPr marL="23864" marR="23864" marT="23864" marB="0" anchor="b"/>
+                </a:tc>
+                <a:tc>
+                  <a:txBody>
+                    <a:bodyPr/>
+                    <a:lstStyle/>
+                    <a:p>
+                      <a:pPr algn="l" fontAlgn="b"/>
+                      <a:r>
+                        <a:rPr lang="tr-TR" sz="2800" u="none" strike="noStrike" dirty="0">
+                          <a:effectLst/>
+                        </a:rPr>
+                        <a:t>ON</a:t>
+                      </a:r>
+                      <a:endParaRPr lang="tr-TR" sz="2800" b="1" i="0" u="none" strike="noStrike" dirty="0">
+                        <a:solidFill>
+                          <a:srgbClr val="000000"/>
+                        </a:solidFill>
+                        <a:effectLst/>
+                        <a:latin typeface="Calibri" panose="020F0502020204030204" pitchFamily="34" charset="0"/>
+                      </a:endParaRPr>
+                    </a:p>
+                  </a:txBody>
+                  <a:tcPr marL="23864" marR="23864" marT="23864" marB="0" anchor="b"/>
+                </a:tc>
+                <a:extLst>
+                  <a:ext uri="{0D108BD9-81ED-4DB2-BD59-A6C34878D82A}">
+                    <a16:rowId xmlns:a16="http://schemas.microsoft.com/office/drawing/2014/main" val="3996089381"/>
+                  </a:ext>
+                </a:extLst>
+              </a:tr>
+            </a:tbl>
+          </a:graphicData>
+        </a:graphic>
+      </p:graphicFrame>
+    </p:spTree>
+    <p:extLst>
+      <p:ext uri="{BB962C8B-B14F-4D97-AF65-F5344CB8AC3E}">
+        <p14:creationId xmlns:p14="http://schemas.microsoft.com/office/powerpoint/2010/main" val="2551081487"/>
+      </p:ext>
+    </p:extLst>
+  </p:cSld>
+  <p:clrMapOvr>
+    <a:masterClrMapping/>
+  </p:clrMapOvr>
+</p:sld>
+</file>
+
+<file path=ppt/slides/slide5.xml><?xml version="1.0" encoding="utf-8"?>
+<p:sld xmlns:a="http://schemas.openxmlformats.org/drawingml/2006/main" xmlns:r="http://schemas.openxmlformats.org/officeDocument/2006/relationships" xmlns:p="http://schemas.openxmlformats.org/presentationml/2006/main">
+  <p:cSld>
+    <p:spTree>
+      <p:nvGrpSpPr>
+        <p:cNvPr id="1" name=""/>
+        <p:cNvGrpSpPr/>
+        <p:nvPr/>
+      </p:nvGrpSpPr>
+      <p:grpSpPr>
+        <a:xfrm>
+          <a:off x="0" y="0"/>
+          <a:ext cx="0" cy="0"/>
+          <a:chOff x="0" y="0"/>
+          <a:chExt cx="0" cy="0"/>
+        </a:xfrm>
+      </p:grpSpPr>
+      <p:sp>
+        <p:nvSpPr>
+          <p:cNvPr id="2" name="Title 1">
+            <a:extLst>
+              <a:ext uri="{FF2B5EF4-FFF2-40B4-BE49-F238E27FC236}">
+                <a16:creationId xmlns:a16="http://schemas.microsoft.com/office/drawing/2014/main" id="{4D4D51E4-5AB2-3068-5174-2E5100667E20}"/>
+              </a:ext>
+            </a:extLst>
+          </p:cNvPr>
+          <p:cNvSpPr>
+            <a:spLocks noGrp="1"/>
+          </p:cNvSpPr>
+          <p:nvPr>
+            <p:ph type="title"/>
+          </p:nvPr>
+        </p:nvSpPr>
+        <p:spPr/>
+        <p:txBody>
+          <a:bodyPr/>
+          <a:lstStyle/>
+          <a:p>
+            <a:r>
+              <a:rPr lang="en-US" dirty="0"/>
+              <a:t>Sinusoidal PWM</a:t>
+            </a:r>
+            <a:endParaRPr lang="tr-TR" dirty="0"/>
+          </a:p>
+        </p:txBody>
+      </p:sp>
+      <p:sp>
+        <p:nvSpPr>
+          <p:cNvPr id="3" name="Content Placeholder 2">
+            <a:extLst>
+              <a:ext uri="{FF2B5EF4-FFF2-40B4-BE49-F238E27FC236}">
+                <a16:creationId xmlns:a16="http://schemas.microsoft.com/office/drawing/2014/main" id="{B1C548F1-BDA9-776B-2BDC-8AA77D51DF14}"/>
+              </a:ext>
+            </a:extLst>
+          </p:cNvPr>
+          <p:cNvSpPr>
+            <a:spLocks noGrp="1"/>
+          </p:cNvSpPr>
+          <p:nvPr>
+            <p:ph idx="1"/>
+          </p:nvPr>
+        </p:nvSpPr>
+        <p:spPr/>
+        <p:txBody>
+          <a:bodyPr/>
+          <a:lstStyle/>
+          <a:p>
+            <a:r>
+              <a:rPr lang="en-US" dirty="0"/>
+              <a:t>This method does not control the neutral point.</a:t>
+            </a:r>
+          </a:p>
+          <a:p>
+            <a:endParaRPr lang="en-US" dirty="0"/>
+          </a:p>
+          <a:p>
+            <a:r>
+              <a:rPr lang="en-US" dirty="0"/>
+              <a:t>Large capacitors needed.</a:t>
+            </a:r>
+            <a:endParaRPr lang="tr-TR" dirty="0"/>
+          </a:p>
+        </p:txBody>
+      </p:sp>
+    </p:spTree>
+    <p:extLst>
+      <p:ext uri="{BB962C8B-B14F-4D97-AF65-F5344CB8AC3E}">
+        <p14:creationId xmlns:p14="http://schemas.microsoft.com/office/powerpoint/2010/main" val="723508890"/>
+      </p:ext>
+    </p:extLst>
+  </p:cSld>
+  <p:clrMapOvr>
+    <a:masterClrMapping/>
+  </p:clrMapOvr>
+</p:sld>
+</file>
+
+<file path=ppt/slides/slide6.xml><?xml version="1.0" encoding="utf-8"?>
+<p:sld xmlns:a="http://schemas.openxmlformats.org/drawingml/2006/main" xmlns:r="http://schemas.openxmlformats.org/officeDocument/2006/relationships" xmlns:p="http://schemas.openxmlformats.org/presentationml/2006/main">
+  <p:cSld>
+    <p:spTree>
+      <p:nvGrpSpPr>
+        <p:cNvPr id="1" name=""/>
+        <p:cNvGrpSpPr/>
+        <p:nvPr/>
+      </p:nvGrpSpPr>
+      <p:grpSpPr>
+        <a:xfrm>
+          <a:off x="0" y="0"/>
+          <a:ext cx="0" cy="0"/>
+          <a:chOff x="0" y="0"/>
+          <a:chExt cx="0" cy="0"/>
+        </a:xfrm>
+      </p:grpSpPr>
       <p:sp>
         <p:nvSpPr>
           <p:cNvPr id="2" name="Title 1">
@@ -3895,7 +5004,7 @@
           <a:bodyPr/>
           <a:lstStyle/>
           <a:p>
-            <a:endParaRPr lang="en-TR"/>
+            <a:endParaRPr lang="en-TR" dirty="0"/>
           </a:p>
         </p:txBody>
       </p:sp>

</xml_diff>